<commit_message>
SRS完成 CMHSS XML 跟 PNG添增
</commit_message>
<xml_diff>
--- a/doc/report.pptx
+++ b/doc/report.pptx
@@ -5,10 +5,10 @@
     <p:sldMasterId id="2147483828" r:id="rId1"/>
   </p:sldMasterIdLst>
   <p:notesMasterIdLst>
-    <p:notesMasterId r:id="rId15"/>
+    <p:notesMasterId r:id="rId16"/>
   </p:notesMasterIdLst>
   <p:handoutMasterIdLst>
-    <p:handoutMasterId r:id="rId16"/>
+    <p:handoutMasterId r:id="rId17"/>
   </p:handoutMasterIdLst>
   <p:sldIdLst>
     <p:sldId id="256" r:id="rId2"/>
@@ -24,6 +24,7 @@
     <p:sldId id="264" r:id="rId12"/>
     <p:sldId id="265" r:id="rId13"/>
     <p:sldId id="258" r:id="rId14"/>
+    <p:sldId id="269" r:id="rId15"/>
   </p:sldIdLst>
   <p:sldSz cx="9144000" cy="6858000" type="screen4x3"/>
   <p:notesSz cx="7099300" cy="10234613"/>
@@ -275,6 +276,11 @@
         </p:txBody>
       </p:sp>
     </p:spTree>
+    <p:extLst>
+      <p:ext uri="{BB962C8B-B14F-4D97-AF65-F5344CB8AC3E}">
+        <p14:creationId xmlns:p14="http://schemas.microsoft.com/office/powerpoint/2010/main" val="3268074773"/>
+      </p:ext>
+    </p:extLst>
   </p:cSld>
   <p:clrMap bg1="lt1" tx1="dk1" bg2="lt2" tx2="dk2" accent1="accent1" accent2="accent2" accent3="accent3" accent4="accent4" accent5="accent5" accent6="accent6" hlink="hlink" folHlink="folHlink"/>
   <p:hf hdr="0" ftr="0" dt="0"/>
@@ -381,7 +387,7 @@
               <a:pPr>
                 <a:defRPr/>
               </a:pPr>
-              <a:t>2017/10/30</a:t>
+              <a:t>2017/10/31</a:t>
             </a:fld>
             <a:endParaRPr lang="zh-TW" altLang="en-US"/>
           </a:p>
@@ -561,6 +567,11 @@
         </p:txBody>
       </p:sp>
     </p:spTree>
+    <p:extLst>
+      <p:ext uri="{BB962C8B-B14F-4D97-AF65-F5344CB8AC3E}">
+        <p14:creationId xmlns:p14="http://schemas.microsoft.com/office/powerpoint/2010/main" val="1012400098"/>
+      </p:ext>
+    </p:extLst>
   </p:cSld>
   <p:clrMap bg1="lt1" tx1="dk1" bg2="lt2" tx2="dk2" accent1="accent1" accent2="accent2" accent3="accent3" accent4="accent4" accent5="accent5" accent6="accent6" hlink="hlink" folHlink="folHlink"/>
   <p:hf hdr="0" ftr="0" dt="0"/>
@@ -1423,7 +1434,7 @@
               <a:pPr>
                 <a:defRPr/>
               </a:pPr>
-              <a:t>2017/10/30</a:t>
+              <a:t>2017/10/31</a:t>
             </a:fld>
             <a:endParaRPr lang="zh-TW" altLang="en-US"/>
           </a:p>
@@ -1618,7 +1629,7 @@
               <a:pPr>
                 <a:defRPr/>
               </a:pPr>
-              <a:t>2017/10/30</a:t>
+              <a:t>2017/10/31</a:t>
             </a:fld>
             <a:endParaRPr lang="zh-TW" altLang="en-US"/>
           </a:p>
@@ -1823,7 +1834,7 @@
               <a:pPr>
                 <a:defRPr/>
               </a:pPr>
-              <a:t>2017/10/30</a:t>
+              <a:t>2017/10/31</a:t>
             </a:fld>
             <a:endParaRPr lang="zh-TW" altLang="en-US"/>
           </a:p>
@@ -2062,7 +2073,7 @@
               <a:pPr>
                 <a:defRPr/>
               </a:pPr>
-              <a:t>2017/10/30</a:t>
+              <a:t>2017/10/31</a:t>
             </a:fld>
             <a:endParaRPr lang="zh-TW" altLang="en-US"/>
           </a:p>
@@ -2331,7 +2342,7 @@
               <a:pPr>
                 <a:defRPr/>
               </a:pPr>
-              <a:t>2017/10/30</a:t>
+              <a:t>2017/10/31</a:t>
             </a:fld>
             <a:endParaRPr lang="zh-TW" altLang="en-US"/>
           </a:p>
@@ -2644,7 +2655,7 @@
               <a:pPr>
                 <a:defRPr/>
               </a:pPr>
-              <a:t>2017/10/30</a:t>
+              <a:t>2017/10/31</a:t>
             </a:fld>
             <a:endParaRPr lang="zh-TW" altLang="en-US"/>
           </a:p>
@@ -3091,7 +3102,7 @@
               <a:pPr>
                 <a:defRPr/>
               </a:pPr>
-              <a:t>2017/10/30</a:t>
+              <a:t>2017/10/31</a:t>
             </a:fld>
             <a:endParaRPr lang="zh-TW" altLang="en-US"/>
           </a:p>
@@ -3234,7 +3245,7 @@
               <a:pPr>
                 <a:defRPr/>
               </a:pPr>
-              <a:t>2017/10/30</a:t>
+              <a:t>2017/10/31</a:t>
             </a:fld>
             <a:endParaRPr lang="zh-TW" altLang="en-US"/>
           </a:p>
@@ -3354,7 +3365,7 @@
               <a:pPr>
                 <a:defRPr/>
               </a:pPr>
-              <a:t>2017/10/30</a:t>
+              <a:t>2017/10/31</a:t>
             </a:fld>
             <a:endParaRPr lang="zh-TW" altLang="en-US"/>
           </a:p>
@@ -3656,7 +3667,7 @@
               <a:pPr>
                 <a:defRPr/>
               </a:pPr>
-              <a:t>2017/10/30</a:t>
+              <a:t>2017/10/31</a:t>
             </a:fld>
             <a:endParaRPr lang="zh-TW" altLang="en-US"/>
           </a:p>
@@ -3941,7 +3952,7 @@
               <a:pPr>
                 <a:defRPr/>
               </a:pPr>
-              <a:t>2017/10/30</a:t>
+              <a:t>2017/10/31</a:t>
             </a:fld>
             <a:endParaRPr lang="zh-TW" altLang="en-US"/>
           </a:p>
@@ -4223,7 +4234,7 @@
               <a:pPr>
                 <a:defRPr/>
               </a:pPr>
-              <a:t>2017/10/30</a:t>
+              <a:t>2017/10/31</a:t>
             </a:fld>
             <a:endParaRPr lang="zh-TW" altLang="en-US"/>
           </a:p>
@@ -5065,7 +5076,7 @@
               <a:pPr>
                 <a:defRPr/>
               </a:pPr>
-              <a:t>2017/10/30</a:t>
+              <a:t>2017/10/31</a:t>
             </a:fld>
             <a:endParaRPr lang="zh-TW" altLang="en-US"/>
           </a:p>
@@ -5263,14 +5274,14 @@
                 <a:gridCol w="2712099">
                   <a:extLst>
                     <a:ext uri="{9D8B030D-6E8A-4147-A177-3AD203B41FA5}">
-                      <a16:colId xmlns:a16="http://schemas.microsoft.com/office/drawing/2014/main" val="87633011"/>
+                      <a16:colId xmlns:a16="http://schemas.microsoft.com/office/drawing/2014/main" xmlns="" val="87633011"/>
                     </a:ext>
                   </a:extLst>
                 </a:gridCol>
                 <a:gridCol w="5449101">
                   <a:extLst>
                     <a:ext uri="{9D8B030D-6E8A-4147-A177-3AD203B41FA5}">
-                      <a16:colId xmlns:a16="http://schemas.microsoft.com/office/drawing/2014/main" val="2925896174"/>
+                      <a16:colId xmlns:a16="http://schemas.microsoft.com/office/drawing/2014/main" xmlns="" val="2925896174"/>
                     </a:ext>
                   </a:extLst>
                 </a:gridCol>
@@ -5306,7 +5317,7 @@
                 </a:tc>
                 <a:extLst>
                   <a:ext uri="{0D108BD9-81ED-4DB2-BD59-A6C34878D82A}">
-                    <a16:rowId xmlns:a16="http://schemas.microsoft.com/office/drawing/2014/main" val="3895224598"/>
+                    <a16:rowId xmlns:a16="http://schemas.microsoft.com/office/drawing/2014/main" xmlns="" val="3895224598"/>
                   </a:ext>
                 </a:extLst>
               </a:tr>
@@ -5395,7 +5406,7 @@
                 </a:tc>
                 <a:extLst>
                   <a:ext uri="{0D108BD9-81ED-4DB2-BD59-A6C34878D82A}">
-                    <a16:rowId xmlns:a16="http://schemas.microsoft.com/office/drawing/2014/main" val="2227397568"/>
+                    <a16:rowId xmlns:a16="http://schemas.microsoft.com/office/drawing/2014/main" xmlns="" val="2227397568"/>
                   </a:ext>
                 </a:extLst>
               </a:tr>
@@ -5476,7 +5487,7 @@
                 </a:tc>
                 <a:extLst>
                   <a:ext uri="{0D108BD9-81ED-4DB2-BD59-A6C34878D82A}">
-                    <a16:rowId xmlns:a16="http://schemas.microsoft.com/office/drawing/2014/main" val="2285874812"/>
+                    <a16:rowId xmlns:a16="http://schemas.microsoft.com/office/drawing/2014/main" xmlns="" val="2285874812"/>
                   </a:ext>
                 </a:extLst>
               </a:tr>
@@ -5536,7 +5547,7 @@
                 </a:tc>
                 <a:extLst>
                   <a:ext uri="{0D108BD9-81ED-4DB2-BD59-A6C34878D82A}">
-                    <a16:rowId xmlns:a16="http://schemas.microsoft.com/office/drawing/2014/main" val="3504635375"/>
+                    <a16:rowId xmlns:a16="http://schemas.microsoft.com/office/drawing/2014/main" xmlns="" val="3504635375"/>
                   </a:ext>
                 </a:extLst>
               </a:tr>
@@ -5604,7 +5615,7 @@
                 </a:tc>
                 <a:extLst>
                   <a:ext uri="{0D108BD9-81ED-4DB2-BD59-A6C34878D82A}">
-                    <a16:rowId xmlns:a16="http://schemas.microsoft.com/office/drawing/2014/main" val="1370675075"/>
+                    <a16:rowId xmlns:a16="http://schemas.microsoft.com/office/drawing/2014/main" xmlns="" val="1370675075"/>
                   </a:ext>
                 </a:extLst>
               </a:tr>
@@ -5664,7 +5675,7 @@
                 </a:tc>
                 <a:extLst>
                   <a:ext uri="{0D108BD9-81ED-4DB2-BD59-A6C34878D82A}">
-                    <a16:rowId xmlns:a16="http://schemas.microsoft.com/office/drawing/2014/main" val="4079855752"/>
+                    <a16:rowId xmlns:a16="http://schemas.microsoft.com/office/drawing/2014/main" xmlns="" val="4079855752"/>
                   </a:ext>
                 </a:extLst>
               </a:tr>
@@ -5724,7 +5735,7 @@
                 </a:tc>
                 <a:extLst>
                   <a:ext uri="{0D108BD9-81ED-4DB2-BD59-A6C34878D82A}">
-                    <a16:rowId xmlns:a16="http://schemas.microsoft.com/office/drawing/2014/main" val="3252417867"/>
+                    <a16:rowId xmlns:a16="http://schemas.microsoft.com/office/drawing/2014/main" xmlns="" val="3252417867"/>
                   </a:ext>
                 </a:extLst>
               </a:tr>
@@ -5784,7 +5795,7 @@
                 </a:tc>
                 <a:extLst>
                   <a:ext uri="{0D108BD9-81ED-4DB2-BD59-A6C34878D82A}">
-                    <a16:rowId xmlns:a16="http://schemas.microsoft.com/office/drawing/2014/main" val="2776023583"/>
+                    <a16:rowId xmlns:a16="http://schemas.microsoft.com/office/drawing/2014/main" xmlns="" val="2776023583"/>
                   </a:ext>
                 </a:extLst>
               </a:tr>
@@ -5859,7 +5870,7 @@
                 </a:tc>
                 <a:extLst>
                   <a:ext uri="{0D108BD9-81ED-4DB2-BD59-A6C34878D82A}">
-                    <a16:rowId xmlns:a16="http://schemas.microsoft.com/office/drawing/2014/main" val="1167250090"/>
+                    <a16:rowId xmlns:a16="http://schemas.microsoft.com/office/drawing/2014/main" xmlns="" val="1167250090"/>
                   </a:ext>
                 </a:extLst>
               </a:tr>
@@ -5939,7 +5950,7 @@
                 </a:tc>
                 <a:extLst>
                   <a:ext uri="{0D108BD9-81ED-4DB2-BD59-A6C34878D82A}">
-                    <a16:rowId xmlns:a16="http://schemas.microsoft.com/office/drawing/2014/main" val="3851974090"/>
+                    <a16:rowId xmlns:a16="http://schemas.microsoft.com/office/drawing/2014/main" xmlns="" val="3851974090"/>
                   </a:ext>
                 </a:extLst>
               </a:tr>
@@ -6011,7 +6022,7 @@
                 </a:tc>
                 <a:extLst>
                   <a:ext uri="{0D108BD9-81ED-4DB2-BD59-A6C34878D82A}">
-                    <a16:rowId xmlns:a16="http://schemas.microsoft.com/office/drawing/2014/main" val="3064833447"/>
+                    <a16:rowId xmlns:a16="http://schemas.microsoft.com/office/drawing/2014/main" xmlns="" val="3064833447"/>
                   </a:ext>
                 </a:extLst>
               </a:tr>
@@ -6083,7 +6094,7 @@
                 </a:tc>
                 <a:extLst>
                   <a:ext uri="{0D108BD9-81ED-4DB2-BD59-A6C34878D82A}">
-                    <a16:rowId xmlns:a16="http://schemas.microsoft.com/office/drawing/2014/main" val="1873275827"/>
+                    <a16:rowId xmlns:a16="http://schemas.microsoft.com/office/drawing/2014/main" xmlns="" val="1873275827"/>
                   </a:ext>
                 </a:extLst>
               </a:tr>
@@ -6163,7 +6174,7 @@
                 </a:tc>
                 <a:extLst>
                   <a:ext uri="{0D108BD9-81ED-4DB2-BD59-A6C34878D82A}">
-                    <a16:rowId xmlns:a16="http://schemas.microsoft.com/office/drawing/2014/main" val="4216443485"/>
+                    <a16:rowId xmlns:a16="http://schemas.microsoft.com/office/drawing/2014/main" xmlns="" val="4216443485"/>
                   </a:ext>
                 </a:extLst>
               </a:tr>
@@ -6235,7 +6246,7 @@
                 </a:tc>
                 <a:extLst>
                   <a:ext uri="{0D108BD9-81ED-4DB2-BD59-A6C34878D82A}">
-                    <a16:rowId xmlns:a16="http://schemas.microsoft.com/office/drawing/2014/main" val="524508212"/>
+                    <a16:rowId xmlns:a16="http://schemas.microsoft.com/office/drawing/2014/main" xmlns="" val="524508212"/>
                   </a:ext>
                 </a:extLst>
               </a:tr>
@@ -6307,7 +6318,7 @@
                 </a:tc>
                 <a:extLst>
                   <a:ext uri="{0D108BD9-81ED-4DB2-BD59-A6C34878D82A}">
-                    <a16:rowId xmlns:a16="http://schemas.microsoft.com/office/drawing/2014/main" val="2657342310"/>
+                    <a16:rowId xmlns:a16="http://schemas.microsoft.com/office/drawing/2014/main" xmlns="" val="2657342310"/>
                   </a:ext>
                 </a:extLst>
               </a:tr>
@@ -6338,7 +6349,7 @@
               <a:pPr>
                 <a:defRPr/>
               </a:pPr>
-              <a:t>2017/10/30</a:t>
+              <a:t>2017/10/31</a:t>
             </a:fld>
             <a:endParaRPr lang="zh-TW" altLang="en-US"/>
           </a:p>
@@ -6454,14 +6465,14 @@
                 <a:gridCol w="2712099">
                   <a:extLst>
                     <a:ext uri="{9D8B030D-6E8A-4147-A177-3AD203B41FA5}">
-                      <a16:colId xmlns:a16="http://schemas.microsoft.com/office/drawing/2014/main" val="87633011"/>
+                      <a16:colId xmlns:a16="http://schemas.microsoft.com/office/drawing/2014/main" xmlns="" val="87633011"/>
                     </a:ext>
                   </a:extLst>
                 </a:gridCol>
                 <a:gridCol w="5449101">
                   <a:extLst>
                     <a:ext uri="{9D8B030D-6E8A-4147-A177-3AD203B41FA5}">
-                      <a16:colId xmlns:a16="http://schemas.microsoft.com/office/drawing/2014/main" val="2925896174"/>
+                      <a16:colId xmlns:a16="http://schemas.microsoft.com/office/drawing/2014/main" xmlns="" val="2925896174"/>
                     </a:ext>
                   </a:extLst>
                 </a:gridCol>
@@ -6497,7 +6508,7 @@
                 </a:tc>
                 <a:extLst>
                   <a:ext uri="{0D108BD9-81ED-4DB2-BD59-A6C34878D82A}">
-                    <a16:rowId xmlns:a16="http://schemas.microsoft.com/office/drawing/2014/main" val="3895224598"/>
+                    <a16:rowId xmlns:a16="http://schemas.microsoft.com/office/drawing/2014/main" xmlns="" val="3895224598"/>
                   </a:ext>
                 </a:extLst>
               </a:tr>
@@ -6569,7 +6580,7 @@
                 </a:tc>
                 <a:extLst>
                   <a:ext uri="{0D108BD9-81ED-4DB2-BD59-A6C34878D82A}">
-                    <a16:rowId xmlns:a16="http://schemas.microsoft.com/office/drawing/2014/main" val="2227397568"/>
+                    <a16:rowId xmlns:a16="http://schemas.microsoft.com/office/drawing/2014/main" xmlns="" val="2227397568"/>
                   </a:ext>
                 </a:extLst>
               </a:tr>
@@ -6641,7 +6652,7 @@
                 </a:tc>
                 <a:extLst>
                   <a:ext uri="{0D108BD9-81ED-4DB2-BD59-A6C34878D82A}">
-                    <a16:rowId xmlns:a16="http://schemas.microsoft.com/office/drawing/2014/main" val="2285874812"/>
+                    <a16:rowId xmlns:a16="http://schemas.microsoft.com/office/drawing/2014/main" xmlns="" val="2285874812"/>
                   </a:ext>
                 </a:extLst>
               </a:tr>
@@ -6713,7 +6724,7 @@
                 </a:tc>
                 <a:extLst>
                   <a:ext uri="{0D108BD9-81ED-4DB2-BD59-A6C34878D82A}">
-                    <a16:rowId xmlns:a16="http://schemas.microsoft.com/office/drawing/2014/main" val="3504635375"/>
+                    <a16:rowId xmlns:a16="http://schemas.microsoft.com/office/drawing/2014/main" xmlns="" val="3504635375"/>
                   </a:ext>
                 </a:extLst>
               </a:tr>
@@ -6785,7 +6796,7 @@
                 </a:tc>
                 <a:extLst>
                   <a:ext uri="{0D108BD9-81ED-4DB2-BD59-A6C34878D82A}">
-                    <a16:rowId xmlns:a16="http://schemas.microsoft.com/office/drawing/2014/main" val="1370675075"/>
+                    <a16:rowId xmlns:a16="http://schemas.microsoft.com/office/drawing/2014/main" xmlns="" val="1370675075"/>
                   </a:ext>
                 </a:extLst>
               </a:tr>
@@ -6865,7 +6876,7 @@
                 </a:tc>
                 <a:extLst>
                   <a:ext uri="{0D108BD9-81ED-4DB2-BD59-A6C34878D82A}">
-                    <a16:rowId xmlns:a16="http://schemas.microsoft.com/office/drawing/2014/main" val="4079855752"/>
+                    <a16:rowId xmlns:a16="http://schemas.microsoft.com/office/drawing/2014/main" xmlns="" val="4079855752"/>
                   </a:ext>
                 </a:extLst>
               </a:tr>
@@ -6937,7 +6948,7 @@
                 </a:tc>
                 <a:extLst>
                   <a:ext uri="{0D108BD9-81ED-4DB2-BD59-A6C34878D82A}">
-                    <a16:rowId xmlns:a16="http://schemas.microsoft.com/office/drawing/2014/main" val="3252417867"/>
+                    <a16:rowId xmlns:a16="http://schemas.microsoft.com/office/drawing/2014/main" xmlns="" val="3252417867"/>
                   </a:ext>
                 </a:extLst>
               </a:tr>
@@ -7009,7 +7020,7 @@
                 </a:tc>
                 <a:extLst>
                   <a:ext uri="{0D108BD9-81ED-4DB2-BD59-A6C34878D82A}">
-                    <a16:rowId xmlns:a16="http://schemas.microsoft.com/office/drawing/2014/main" val="2776023583"/>
+                    <a16:rowId xmlns:a16="http://schemas.microsoft.com/office/drawing/2014/main" xmlns="" val="2776023583"/>
                   </a:ext>
                 </a:extLst>
               </a:tr>
@@ -7081,7 +7092,7 @@
                 </a:tc>
                 <a:extLst>
                   <a:ext uri="{0D108BD9-81ED-4DB2-BD59-A6C34878D82A}">
-                    <a16:rowId xmlns:a16="http://schemas.microsoft.com/office/drawing/2014/main" val="1167250090"/>
+                    <a16:rowId xmlns:a16="http://schemas.microsoft.com/office/drawing/2014/main" xmlns="" val="1167250090"/>
                   </a:ext>
                 </a:extLst>
               </a:tr>
@@ -7153,7 +7164,7 @@
                 </a:tc>
                 <a:extLst>
                   <a:ext uri="{0D108BD9-81ED-4DB2-BD59-A6C34878D82A}">
-                    <a16:rowId xmlns:a16="http://schemas.microsoft.com/office/drawing/2014/main" val="3851974090"/>
+                    <a16:rowId xmlns:a16="http://schemas.microsoft.com/office/drawing/2014/main" xmlns="" val="3851974090"/>
                   </a:ext>
                 </a:extLst>
               </a:tr>
@@ -7233,7 +7244,7 @@
                 </a:tc>
                 <a:extLst>
                   <a:ext uri="{0D108BD9-81ED-4DB2-BD59-A6C34878D82A}">
-                    <a16:rowId xmlns:a16="http://schemas.microsoft.com/office/drawing/2014/main" val="3064833447"/>
+                    <a16:rowId xmlns:a16="http://schemas.microsoft.com/office/drawing/2014/main" xmlns="" val="3064833447"/>
                   </a:ext>
                 </a:extLst>
               </a:tr>
@@ -7313,7 +7324,7 @@
                 </a:tc>
                 <a:extLst>
                   <a:ext uri="{0D108BD9-81ED-4DB2-BD59-A6C34878D82A}">
-                    <a16:rowId xmlns:a16="http://schemas.microsoft.com/office/drawing/2014/main" val="1873275827"/>
+                    <a16:rowId xmlns:a16="http://schemas.microsoft.com/office/drawing/2014/main" xmlns="" val="1873275827"/>
                   </a:ext>
                 </a:extLst>
               </a:tr>
@@ -7393,7 +7404,7 @@
                 </a:tc>
                 <a:extLst>
                   <a:ext uri="{0D108BD9-81ED-4DB2-BD59-A6C34878D82A}">
-                    <a16:rowId xmlns:a16="http://schemas.microsoft.com/office/drawing/2014/main" val="4216443485"/>
+                    <a16:rowId xmlns:a16="http://schemas.microsoft.com/office/drawing/2014/main" xmlns="" val="4216443485"/>
                   </a:ext>
                 </a:extLst>
               </a:tr>
@@ -7424,7 +7435,7 @@
               <a:pPr>
                 <a:defRPr/>
               </a:pPr>
-              <a:t>2017/10/30</a:t>
+              <a:t>2017/10/31</a:t>
             </a:fld>
             <a:endParaRPr lang="zh-TW" altLang="en-US"/>
           </a:p>
@@ -7544,14 +7555,14 @@
                 <a:gridCol w="4114800">
                   <a:extLst>
                     <a:ext uri="{9D8B030D-6E8A-4147-A177-3AD203B41FA5}">
-                      <a16:colId xmlns:a16="http://schemas.microsoft.com/office/drawing/2014/main" val="62378008"/>
+                      <a16:colId xmlns:a16="http://schemas.microsoft.com/office/drawing/2014/main" xmlns="" val="62378008"/>
                     </a:ext>
                   </a:extLst>
                 </a:gridCol>
                 <a:gridCol w="4114800">
                   <a:extLst>
                     <a:ext uri="{9D8B030D-6E8A-4147-A177-3AD203B41FA5}">
-                      <a16:colId xmlns:a16="http://schemas.microsoft.com/office/drawing/2014/main" val="3074775320"/>
+                      <a16:colId xmlns:a16="http://schemas.microsoft.com/office/drawing/2014/main" xmlns="" val="3074775320"/>
                     </a:ext>
                   </a:extLst>
                 </a:gridCol>
@@ -7587,7 +7598,7 @@
                 </a:tc>
                 <a:extLst>
                   <a:ext uri="{0D108BD9-81ED-4DB2-BD59-A6C34878D82A}">
-                    <a16:rowId xmlns:a16="http://schemas.microsoft.com/office/drawing/2014/main" val="1544415356"/>
+                    <a16:rowId xmlns:a16="http://schemas.microsoft.com/office/drawing/2014/main" xmlns="" val="1544415356"/>
                   </a:ext>
                 </a:extLst>
               </a:tr>
@@ -7659,7 +7670,7 @@
                 </a:tc>
                 <a:extLst>
                   <a:ext uri="{0D108BD9-81ED-4DB2-BD59-A6C34878D82A}">
-                    <a16:rowId xmlns:a16="http://schemas.microsoft.com/office/drawing/2014/main" val="3044866068"/>
+                    <a16:rowId xmlns:a16="http://schemas.microsoft.com/office/drawing/2014/main" xmlns="" val="3044866068"/>
                   </a:ext>
                 </a:extLst>
               </a:tr>
@@ -7698,7 +7709,7 @@
                 </a:tc>
                 <a:extLst>
                   <a:ext uri="{0D108BD9-81ED-4DB2-BD59-A6C34878D82A}">
-                    <a16:rowId xmlns:a16="http://schemas.microsoft.com/office/drawing/2014/main" val="1829722761"/>
+                    <a16:rowId xmlns:a16="http://schemas.microsoft.com/office/drawing/2014/main" xmlns="" val="1829722761"/>
                   </a:ext>
                 </a:extLst>
               </a:tr>
@@ -7753,7 +7764,7 @@
                 </a:tc>
                 <a:extLst>
                   <a:ext uri="{0D108BD9-81ED-4DB2-BD59-A6C34878D82A}">
-                    <a16:rowId xmlns:a16="http://schemas.microsoft.com/office/drawing/2014/main" val="1680919419"/>
+                    <a16:rowId xmlns:a16="http://schemas.microsoft.com/office/drawing/2014/main" xmlns="" val="1680919419"/>
                   </a:ext>
                 </a:extLst>
               </a:tr>
@@ -7808,7 +7819,7 @@
                 </a:tc>
                 <a:extLst>
                   <a:ext uri="{0D108BD9-81ED-4DB2-BD59-A6C34878D82A}">
-                    <a16:rowId xmlns:a16="http://schemas.microsoft.com/office/drawing/2014/main" val="2783317447"/>
+                    <a16:rowId xmlns:a16="http://schemas.microsoft.com/office/drawing/2014/main" xmlns="" val="2783317447"/>
                   </a:ext>
                 </a:extLst>
               </a:tr>
@@ -7863,7 +7874,7 @@
                 </a:tc>
                 <a:extLst>
                   <a:ext uri="{0D108BD9-81ED-4DB2-BD59-A6C34878D82A}">
-                    <a16:rowId xmlns:a16="http://schemas.microsoft.com/office/drawing/2014/main" val="4073050539"/>
+                    <a16:rowId xmlns:a16="http://schemas.microsoft.com/office/drawing/2014/main" xmlns="" val="4073050539"/>
                   </a:ext>
                 </a:extLst>
               </a:tr>
@@ -7918,7 +7929,7 @@
                 </a:tc>
                 <a:extLst>
                   <a:ext uri="{0D108BD9-81ED-4DB2-BD59-A6C34878D82A}">
-                    <a16:rowId xmlns:a16="http://schemas.microsoft.com/office/drawing/2014/main" val="2598383543"/>
+                    <a16:rowId xmlns:a16="http://schemas.microsoft.com/office/drawing/2014/main" xmlns="" val="2598383543"/>
                   </a:ext>
                 </a:extLst>
               </a:tr>
@@ -7973,7 +7984,7 @@
                 </a:tc>
                 <a:extLst>
                   <a:ext uri="{0D108BD9-81ED-4DB2-BD59-A6C34878D82A}">
-                    <a16:rowId xmlns:a16="http://schemas.microsoft.com/office/drawing/2014/main" val="2465584741"/>
+                    <a16:rowId xmlns:a16="http://schemas.microsoft.com/office/drawing/2014/main" xmlns="" val="2465584741"/>
                   </a:ext>
                 </a:extLst>
               </a:tr>
@@ -8028,7 +8039,7 @@
                 </a:tc>
                 <a:extLst>
                   <a:ext uri="{0D108BD9-81ED-4DB2-BD59-A6C34878D82A}">
-                    <a16:rowId xmlns:a16="http://schemas.microsoft.com/office/drawing/2014/main" val="2330444438"/>
+                    <a16:rowId xmlns:a16="http://schemas.microsoft.com/office/drawing/2014/main" xmlns="" val="2330444438"/>
                   </a:ext>
                 </a:extLst>
               </a:tr>
@@ -8083,7 +8094,7 @@
                 </a:tc>
                 <a:extLst>
                   <a:ext uri="{0D108BD9-81ED-4DB2-BD59-A6C34878D82A}">
-                    <a16:rowId xmlns:a16="http://schemas.microsoft.com/office/drawing/2014/main" val="3390130878"/>
+                    <a16:rowId xmlns:a16="http://schemas.microsoft.com/office/drawing/2014/main" xmlns="" val="3390130878"/>
                   </a:ext>
                 </a:extLst>
               </a:tr>
@@ -8138,7 +8149,7 @@
                 </a:tc>
                 <a:extLst>
                   <a:ext uri="{0D108BD9-81ED-4DB2-BD59-A6C34878D82A}">
-                    <a16:rowId xmlns:a16="http://schemas.microsoft.com/office/drawing/2014/main" val="1561468546"/>
+                    <a16:rowId xmlns:a16="http://schemas.microsoft.com/office/drawing/2014/main" xmlns="" val="1561468546"/>
                   </a:ext>
                 </a:extLst>
               </a:tr>
@@ -8169,7 +8180,7 @@
               <a:pPr>
                 <a:defRPr/>
               </a:pPr>
-              <a:t>2017/10/30</a:t>
+              <a:t>2017/10/31</a:t>
             </a:fld>
             <a:endParaRPr lang="zh-TW" altLang="en-US"/>
           </a:p>
@@ -8229,6 +8240,153 @@
     <p:extLst>
       <p:ext uri="{BB962C8B-B14F-4D97-AF65-F5344CB8AC3E}">
         <p14:creationId xmlns:p14="http://schemas.microsoft.com/office/powerpoint/2010/main" val="48295477"/>
+      </p:ext>
+    </p:extLst>
+  </p:cSld>
+  <p:clrMapOvr>
+    <a:masterClrMapping/>
+  </p:clrMapOvr>
+</p:sld>
+</file>
+
+<file path=ppt/slides/slide14.xml><?xml version="1.0" encoding="utf-8"?>
+<p:sld xmlns:a="http://schemas.openxmlformats.org/drawingml/2006/main" xmlns:r="http://schemas.openxmlformats.org/officeDocument/2006/relationships" xmlns:p="http://schemas.openxmlformats.org/presentationml/2006/main">
+  <p:cSld>
+    <p:spTree>
+      <p:nvGrpSpPr>
+        <p:cNvPr id="1" name=""/>
+        <p:cNvGrpSpPr/>
+        <p:nvPr/>
+      </p:nvGrpSpPr>
+      <p:grpSpPr>
+        <a:xfrm>
+          <a:off x="0" y="0"/>
+          <a:ext cx="0" cy="0"/>
+          <a:chOff x="0" y="0"/>
+          <a:chExt cx="0" cy="0"/>
+        </a:xfrm>
+      </p:grpSpPr>
+      <p:sp>
+        <p:nvSpPr>
+          <p:cNvPr id="2" name="標題 1"/>
+          <p:cNvSpPr>
+            <a:spLocks noGrp="1"/>
+          </p:cNvSpPr>
+          <p:nvPr>
+            <p:ph type="title"/>
+          </p:nvPr>
+        </p:nvSpPr>
+        <p:spPr/>
+        <p:txBody>
+          <a:bodyPr/>
+          <a:lstStyle/>
+          <a:p>
+            <a:endParaRPr lang="zh-TW" altLang="en-US"/>
+          </a:p>
+        </p:txBody>
+      </p:sp>
+      <p:sp>
+        <p:nvSpPr>
+          <p:cNvPr id="3" name="內容版面配置區 2"/>
+          <p:cNvSpPr>
+            <a:spLocks noGrp="1"/>
+          </p:cNvSpPr>
+          <p:nvPr>
+            <p:ph idx="1"/>
+          </p:nvPr>
+        </p:nvSpPr>
+        <p:spPr/>
+        <p:txBody>
+          <a:bodyPr/>
+          <a:lstStyle/>
+          <a:p>
+            <a:endParaRPr lang="zh-TW" altLang="en-US"/>
+          </a:p>
+        </p:txBody>
+      </p:sp>
+      <p:sp>
+        <p:nvSpPr>
+          <p:cNvPr id="4" name="日期版面配置區 3"/>
+          <p:cNvSpPr>
+            <a:spLocks noGrp="1"/>
+          </p:cNvSpPr>
+          <p:nvPr>
+            <p:ph type="dt" sz="half" idx="10"/>
+          </p:nvPr>
+        </p:nvSpPr>
+        <p:spPr/>
+        <p:txBody>
+          <a:bodyPr/>
+          <a:lstStyle/>
+          <a:p>
+            <a:pPr>
+              <a:defRPr/>
+            </a:pPr>
+            <a:fld id="{BDD5BDAA-1E82-4E6D-BE3B-29DB0DC5194D}" type="datetime1">
+              <a:rPr lang="zh-TW" altLang="en-US" smtClean="0"/>
+              <a:pPr>
+                <a:defRPr/>
+              </a:pPr>
+              <a:t>2017/10/31</a:t>
+            </a:fld>
+            <a:endParaRPr lang="zh-TW" altLang="en-US"/>
+          </a:p>
+        </p:txBody>
+      </p:sp>
+      <p:sp>
+        <p:nvSpPr>
+          <p:cNvPr id="5" name="頁尾版面配置區 4"/>
+          <p:cNvSpPr>
+            <a:spLocks noGrp="1"/>
+          </p:cNvSpPr>
+          <p:nvPr>
+            <p:ph type="ftr" sz="quarter" idx="11"/>
+          </p:nvPr>
+        </p:nvSpPr>
+        <p:spPr/>
+        <p:txBody>
+          <a:bodyPr/>
+          <a:lstStyle/>
+          <a:p>
+            <a:pPr>
+              <a:defRPr/>
+            </a:pPr>
+            <a:r>
+              <a:rPr lang="zh-TW" altLang="en-US" smtClean="0"/>
+              <a:t>軟體系統實驗室</a:t>
+            </a:r>
+            <a:endParaRPr lang="zh-TW" altLang="en-US"/>
+          </a:p>
+        </p:txBody>
+      </p:sp>
+      <p:sp>
+        <p:nvSpPr>
+          <p:cNvPr id="6" name="投影片編號版面配置區 5"/>
+          <p:cNvSpPr>
+            <a:spLocks noGrp="1"/>
+          </p:cNvSpPr>
+          <p:nvPr>
+            <p:ph type="sldNum" sz="quarter" idx="12"/>
+          </p:nvPr>
+        </p:nvSpPr>
+        <p:spPr/>
+        <p:txBody>
+          <a:bodyPr/>
+          <a:lstStyle/>
+          <a:p>
+            <a:fld id="{B6A84E2D-DD4B-4F2A-87C5-E179AF885E22}" type="slidenum">
+              <a:rPr lang="zh-TW" altLang="en-US" smtClean="0"/>
+              <a:pPr/>
+              <a:t>14</a:t>
+            </a:fld>
+            <a:endParaRPr lang="zh-TW" altLang="en-US"/>
+          </a:p>
+        </p:txBody>
+      </p:sp>
+    </p:spTree>
+    <p:extLst>
+      <p:ext uri="{BB962C8B-B14F-4D97-AF65-F5344CB8AC3E}">
+        <p14:creationId xmlns:p14="http://schemas.microsoft.com/office/powerpoint/2010/main" val="1724752648"/>
       </p:ext>
     </p:extLst>
   </p:cSld>
@@ -8395,7 +8553,7 @@
               <a:pPr>
                 <a:defRPr/>
               </a:pPr>
-              <a:t>2017/10/30</a:t>
+              <a:t>2017/10/31</a:t>
             </a:fld>
             <a:endParaRPr lang="zh-TW" altLang="en-US"/>
           </a:p>
@@ -8506,7 +8664,7 @@
               <a:pPr>
                 <a:defRPr/>
               </a:pPr>
-              <a:t>2017/10/30</a:t>
+              <a:t>2017/10/31</a:t>
             </a:fld>
             <a:endParaRPr lang="zh-TW" altLang="en-US" dirty="0"/>
           </a:p>
@@ -8872,7 +9030,7 @@
               <a:pPr>
                 <a:defRPr/>
               </a:pPr>
-              <a:t>2017/10/30</a:t>
+              <a:t>2017/10/31</a:t>
             </a:fld>
             <a:endParaRPr lang="zh-TW" altLang="en-US"/>
           </a:p>
@@ -9057,7 +9215,7 @@
               <a:pPr>
                 <a:defRPr/>
               </a:pPr>
-              <a:t>2017/10/30</a:t>
+              <a:t>2017/10/31</a:t>
             </a:fld>
             <a:endParaRPr lang="zh-TW" altLang="en-US"/>
           </a:p>
@@ -9135,41 +9293,20 @@
             <a:pPr lvl="1"/>
             <a:r>
               <a:rPr lang="en-US" altLang="zh-TW" dirty="0" smtClean="0"/>
-              <a:t>System Block Diagram</a:t>
+              <a:t>S</a:t>
+            </a:r>
+            <a:r>
+              <a:rPr lang="en-US" altLang="zh-TW" u="sng" dirty="0" smtClean="0"/>
+              <a:t>ystem </a:t>
+            </a:r>
+            <a:r>
+              <a:rPr lang="en-US" altLang="zh-TW" dirty="0" smtClean="0"/>
+              <a:t>Block Diagram</a:t>
             </a:r>
             <a:endParaRPr lang="zh-TW" altLang="en-US" dirty="0"/>
           </a:p>
         </p:txBody>
       </p:sp>
-      <p:pic>
-        <p:nvPicPr>
-          <p:cNvPr id="7" name="內容版面配置區 6"/>
-          <p:cNvPicPr>
-            <a:picLocks noGrp="1" noChangeAspect="1"/>
-          </p:cNvPicPr>
-          <p:nvPr>
-            <p:ph idx="1"/>
-          </p:nvPr>
-        </p:nvPicPr>
-        <p:blipFill>
-          <a:blip r:embed="rId3">
-            <a:extLst>
-              <a:ext uri="{28A0092B-C50C-407E-A947-70E740481C1C}">
-                <a14:useLocalDpi xmlns:a14="http://schemas.microsoft.com/office/drawing/2010/main" val="0"/>
-              </a:ext>
-            </a:extLst>
-          </a:blip>
-          <a:stretch>
-            <a:fillRect/>
-          </a:stretch>
-        </p:blipFill>
-        <p:spPr>
-          <a:xfrm>
-            <a:off x="1557535" y="1763871"/>
-            <a:ext cx="6028929" cy="4198620"/>
-          </a:xfrm>
-        </p:spPr>
-      </p:pic>
       <p:sp>
         <p:nvSpPr>
           <p:cNvPr id="4" name="日期版面配置區 3"/>
@@ -9193,9 +9330,9 @@
               <a:pPr>
                 <a:defRPr/>
               </a:pPr>
-              <a:t>2017/10/30</a:t>
+              <a:t>2017/10/31</a:t>
             </a:fld>
-            <a:endParaRPr lang="zh-TW" altLang="en-US"/>
+            <a:endParaRPr lang="zh-TW" altLang="en-US" dirty="0"/>
           </a:p>
         </p:txBody>
       </p:sp>
@@ -9223,6 +9360,587 @@
           </a:p>
         </p:txBody>
       </p:sp>
+      <p:grpSp>
+        <p:nvGrpSpPr>
+          <p:cNvPr id="23" name="群組 22"/>
+          <p:cNvGrpSpPr/>
+          <p:nvPr/>
+        </p:nvGrpSpPr>
+        <p:grpSpPr>
+          <a:xfrm>
+            <a:off x="1043608" y="1695622"/>
+            <a:ext cx="7272808" cy="4392488"/>
+            <a:chOff x="611560" y="1700808"/>
+            <a:chExt cx="7272808" cy="4392488"/>
+          </a:xfrm>
+        </p:grpSpPr>
+        <p:sp>
+          <p:nvSpPr>
+            <p:cNvPr id="5" name="矩形 4"/>
+            <p:cNvSpPr/>
+            <p:nvPr/>
+          </p:nvSpPr>
+          <p:spPr>
+            <a:xfrm>
+              <a:off x="611560" y="1700808"/>
+              <a:ext cx="7272808" cy="4392488"/>
+            </a:xfrm>
+            <a:prstGeom prst="rect">
+              <a:avLst/>
+            </a:prstGeom>
+            <a:solidFill>
+              <a:schemeClr val="accent5">
+                <a:lumMod val="75000"/>
+              </a:schemeClr>
+            </a:solidFill>
+            <a:ln>
+              <a:solidFill>
+                <a:schemeClr val="tx1"/>
+              </a:solidFill>
+            </a:ln>
+          </p:spPr>
+          <p:style>
+            <a:lnRef idx="2">
+              <a:schemeClr val="accent5">
+                <a:shade val="50000"/>
+              </a:schemeClr>
+            </a:lnRef>
+            <a:fillRef idx="1">
+              <a:schemeClr val="accent5"/>
+            </a:fillRef>
+            <a:effectRef idx="0">
+              <a:schemeClr val="accent5"/>
+            </a:effectRef>
+            <a:fontRef idx="minor">
+              <a:schemeClr val="lt1"/>
+            </a:fontRef>
+          </p:style>
+          <p:txBody>
+            <a:bodyPr rtlCol="0" anchor="ctr"/>
+            <a:lstStyle/>
+            <a:p>
+              <a:pPr algn="ctr"/>
+              <a:endParaRPr lang="zh-TW" altLang="en-US"/>
+            </a:p>
+          </p:txBody>
+        </p:sp>
+        <p:sp>
+          <p:nvSpPr>
+            <p:cNvPr id="8" name="文字方塊 7"/>
+            <p:cNvSpPr txBox="1"/>
+            <p:nvPr/>
+          </p:nvSpPr>
+          <p:spPr>
+            <a:xfrm>
+              <a:off x="2483768" y="1851130"/>
+              <a:ext cx="3672408" cy="523220"/>
+            </a:xfrm>
+            <a:prstGeom prst="rect">
+              <a:avLst/>
+            </a:prstGeom>
+            <a:noFill/>
+          </p:spPr>
+          <p:txBody>
+            <a:bodyPr wrap="square" rtlCol="0">
+              <a:spAutoFit/>
+            </a:bodyPr>
+            <a:lstStyle/>
+            <a:p>
+              <a:pPr algn="ctr"/>
+              <a:r>
+                <a:rPr lang="en-US" altLang="zh-TW" sz="2800" dirty="0" smtClean="0">
+                  <a:solidFill>
+                    <a:schemeClr val="bg1"/>
+                  </a:solidFill>
+                </a:rPr>
+                <a:t>PASS</a:t>
+              </a:r>
+              <a:endParaRPr lang="zh-TW" altLang="en-US" sz="2800" dirty="0">
+                <a:solidFill>
+                  <a:schemeClr val="bg1"/>
+                </a:solidFill>
+              </a:endParaRPr>
+            </a:p>
+          </p:txBody>
+        </p:sp>
+        <p:sp>
+          <p:nvSpPr>
+            <p:cNvPr id="9" name="矩形 8"/>
+            <p:cNvSpPr/>
+            <p:nvPr/>
+          </p:nvSpPr>
+          <p:spPr>
+            <a:xfrm>
+              <a:off x="1475656" y="2399574"/>
+              <a:ext cx="2952328" cy="1558706"/>
+            </a:xfrm>
+            <a:prstGeom prst="rect">
+              <a:avLst/>
+            </a:prstGeom>
+            <a:solidFill>
+              <a:schemeClr val="accent1">
+                <a:lumMod val="75000"/>
+              </a:schemeClr>
+            </a:solidFill>
+            <a:ln>
+              <a:solidFill>
+                <a:schemeClr val="tx1"/>
+              </a:solidFill>
+            </a:ln>
+          </p:spPr>
+          <p:style>
+            <a:lnRef idx="2">
+              <a:schemeClr val="accent1">
+                <a:shade val="50000"/>
+              </a:schemeClr>
+            </a:lnRef>
+            <a:fillRef idx="1">
+              <a:schemeClr val="accent1"/>
+            </a:fillRef>
+            <a:effectRef idx="0">
+              <a:schemeClr val="accent1"/>
+            </a:effectRef>
+            <a:fontRef idx="minor">
+              <a:schemeClr val="lt1"/>
+            </a:fontRef>
+          </p:style>
+          <p:txBody>
+            <a:bodyPr rtlCol="0" anchor="ctr"/>
+            <a:lstStyle/>
+            <a:p>
+              <a:pPr algn="ctr"/>
+              <a:endParaRPr lang="zh-TW" altLang="en-US"/>
+            </a:p>
+          </p:txBody>
+        </p:sp>
+        <p:sp>
+          <p:nvSpPr>
+            <p:cNvPr id="11" name="矩形 10"/>
+            <p:cNvSpPr/>
+            <p:nvPr/>
+          </p:nvSpPr>
+          <p:spPr>
+            <a:xfrm>
+              <a:off x="1475656" y="4051602"/>
+              <a:ext cx="2952327" cy="1825669"/>
+            </a:xfrm>
+            <a:prstGeom prst="rect">
+              <a:avLst/>
+            </a:prstGeom>
+            <a:solidFill>
+              <a:schemeClr val="accent1">
+                <a:lumMod val="75000"/>
+              </a:schemeClr>
+            </a:solidFill>
+            <a:ln>
+              <a:solidFill>
+                <a:schemeClr val="tx1"/>
+              </a:solidFill>
+            </a:ln>
+          </p:spPr>
+          <p:style>
+            <a:lnRef idx="2">
+              <a:schemeClr val="accent1">
+                <a:shade val="50000"/>
+              </a:schemeClr>
+            </a:lnRef>
+            <a:fillRef idx="1">
+              <a:schemeClr val="accent1"/>
+            </a:fillRef>
+            <a:effectRef idx="0">
+              <a:schemeClr val="accent1"/>
+            </a:effectRef>
+            <a:fontRef idx="minor">
+              <a:schemeClr val="lt1"/>
+            </a:fontRef>
+          </p:style>
+          <p:txBody>
+            <a:bodyPr rtlCol="0" anchor="ctr"/>
+            <a:lstStyle/>
+            <a:p>
+              <a:pPr algn="ctr"/>
+              <a:endParaRPr lang="zh-TW" altLang="en-US"/>
+            </a:p>
+          </p:txBody>
+        </p:sp>
+        <p:sp>
+          <p:nvSpPr>
+            <p:cNvPr id="12" name="矩形 11"/>
+            <p:cNvSpPr/>
+            <p:nvPr/>
+          </p:nvSpPr>
+          <p:spPr>
+            <a:xfrm>
+              <a:off x="4777531" y="3136803"/>
+              <a:ext cx="2831976" cy="1558706"/>
+            </a:xfrm>
+            <a:prstGeom prst="rect">
+              <a:avLst/>
+            </a:prstGeom>
+            <a:solidFill>
+              <a:schemeClr val="accent1">
+                <a:lumMod val="75000"/>
+              </a:schemeClr>
+            </a:solidFill>
+            <a:ln>
+              <a:solidFill>
+                <a:schemeClr val="tx1"/>
+              </a:solidFill>
+            </a:ln>
+          </p:spPr>
+          <p:style>
+            <a:lnRef idx="2">
+              <a:schemeClr val="accent6">
+                <a:shade val="50000"/>
+              </a:schemeClr>
+            </a:lnRef>
+            <a:fillRef idx="1">
+              <a:schemeClr val="accent6"/>
+            </a:fillRef>
+            <a:effectRef idx="0">
+              <a:schemeClr val="accent6"/>
+            </a:effectRef>
+            <a:fontRef idx="minor">
+              <a:schemeClr val="lt1"/>
+            </a:fontRef>
+          </p:style>
+          <p:txBody>
+            <a:bodyPr rtlCol="0" anchor="ctr"/>
+            <a:lstStyle/>
+            <a:p>
+              <a:pPr algn="ctr"/>
+              <a:r>
+                <a:rPr lang="en-US" altLang="zh-TW" sz="7200" b="1" dirty="0" smtClean="0"/>
+                <a:t>DB</a:t>
+              </a:r>
+              <a:endParaRPr lang="zh-TW" altLang="en-US" b="1" dirty="0"/>
+            </a:p>
+          </p:txBody>
+        </p:sp>
+        <p:sp>
+          <p:nvSpPr>
+            <p:cNvPr id="13" name="矩形 12"/>
+            <p:cNvSpPr/>
+            <p:nvPr/>
+          </p:nvSpPr>
+          <p:spPr>
+            <a:xfrm>
+              <a:off x="1575233" y="2903756"/>
+              <a:ext cx="2744619" cy="466094"/>
+            </a:xfrm>
+            <a:prstGeom prst="rect">
+              <a:avLst/>
+            </a:prstGeom>
+            <a:ln>
+              <a:solidFill>
+                <a:schemeClr val="tx1"/>
+              </a:solidFill>
+            </a:ln>
+          </p:spPr>
+          <p:style>
+            <a:lnRef idx="2">
+              <a:schemeClr val="accent1">
+                <a:shade val="50000"/>
+              </a:schemeClr>
+            </a:lnRef>
+            <a:fillRef idx="1">
+              <a:schemeClr val="accent1"/>
+            </a:fillRef>
+            <a:effectRef idx="0">
+              <a:schemeClr val="accent1"/>
+            </a:effectRef>
+            <a:fontRef idx="minor">
+              <a:schemeClr val="lt1"/>
+            </a:fontRef>
+          </p:style>
+          <p:txBody>
+            <a:bodyPr rtlCol="0" anchor="ctr"/>
+            <a:lstStyle/>
+            <a:p>
+              <a:pPr algn="ctr"/>
+              <a:r>
+                <a:rPr lang="zh-TW" altLang="en-US" dirty="0" smtClean="0"/>
+                <a:t>使用者管理</a:t>
+              </a:r>
+              <a:endParaRPr lang="zh-TW" altLang="en-US" dirty="0"/>
+            </a:p>
+          </p:txBody>
+        </p:sp>
+        <p:sp>
+          <p:nvSpPr>
+            <p:cNvPr id="14" name="矩形 13"/>
+            <p:cNvSpPr/>
+            <p:nvPr/>
+          </p:nvSpPr>
+          <p:spPr>
+            <a:xfrm>
+              <a:off x="1575233" y="3429001"/>
+              <a:ext cx="2744619" cy="431408"/>
+            </a:xfrm>
+            <a:prstGeom prst="rect">
+              <a:avLst/>
+            </a:prstGeom>
+            <a:ln>
+              <a:solidFill>
+                <a:schemeClr val="tx1"/>
+              </a:solidFill>
+            </a:ln>
+          </p:spPr>
+          <p:style>
+            <a:lnRef idx="2">
+              <a:schemeClr val="accent1">
+                <a:shade val="50000"/>
+              </a:schemeClr>
+            </a:lnRef>
+            <a:fillRef idx="1">
+              <a:schemeClr val="accent1"/>
+            </a:fillRef>
+            <a:effectRef idx="0">
+              <a:schemeClr val="accent1"/>
+            </a:effectRef>
+            <a:fontRef idx="minor">
+              <a:schemeClr val="lt1"/>
+            </a:fontRef>
+          </p:style>
+          <p:txBody>
+            <a:bodyPr rtlCol="0" anchor="ctr"/>
+            <a:lstStyle/>
+            <a:p>
+              <a:pPr algn="ctr"/>
+              <a:r>
+                <a:rPr lang="zh-TW" altLang="en-US" dirty="0" smtClean="0"/>
+                <a:t>權限管理</a:t>
+              </a:r>
+              <a:endParaRPr lang="zh-TW" altLang="en-US" dirty="0"/>
+            </a:p>
+          </p:txBody>
+        </p:sp>
+        <p:sp>
+          <p:nvSpPr>
+            <p:cNvPr id="18" name="文字方塊 17"/>
+            <p:cNvSpPr txBox="1"/>
+            <p:nvPr/>
+          </p:nvSpPr>
+          <p:spPr>
+            <a:xfrm>
+              <a:off x="1907704" y="2492896"/>
+              <a:ext cx="2160240" cy="369332"/>
+            </a:xfrm>
+            <a:prstGeom prst="rect">
+              <a:avLst/>
+            </a:prstGeom>
+            <a:noFill/>
+          </p:spPr>
+          <p:txBody>
+            <a:bodyPr wrap="square" rtlCol="0">
+              <a:spAutoFit/>
+            </a:bodyPr>
+            <a:lstStyle/>
+            <a:p>
+              <a:pPr algn="ctr"/>
+              <a:r>
+                <a:rPr lang="en-US" altLang="zh-TW" dirty="0" smtClean="0">
+                  <a:solidFill>
+                    <a:schemeClr val="bg1"/>
+                  </a:solidFill>
+                </a:rPr>
+                <a:t>UMS</a:t>
+              </a:r>
+              <a:endParaRPr lang="zh-TW" altLang="en-US" dirty="0">
+                <a:solidFill>
+                  <a:schemeClr val="bg1"/>
+                </a:solidFill>
+              </a:endParaRPr>
+            </a:p>
+          </p:txBody>
+        </p:sp>
+        <p:sp>
+          <p:nvSpPr>
+            <p:cNvPr id="19" name="文字方塊 18"/>
+            <p:cNvSpPr txBox="1"/>
+            <p:nvPr/>
+          </p:nvSpPr>
+          <p:spPr>
+            <a:xfrm>
+              <a:off x="1804190" y="4056784"/>
+              <a:ext cx="2219417" cy="369332"/>
+            </a:xfrm>
+            <a:prstGeom prst="rect">
+              <a:avLst/>
+            </a:prstGeom>
+            <a:noFill/>
+          </p:spPr>
+          <p:txBody>
+            <a:bodyPr wrap="square" rtlCol="0">
+              <a:spAutoFit/>
+            </a:bodyPr>
+            <a:lstStyle/>
+            <a:p>
+              <a:pPr algn="ctr"/>
+              <a:r>
+                <a:rPr lang="en-US" altLang="zh-TW" dirty="0" smtClean="0">
+                  <a:solidFill>
+                    <a:schemeClr val="bg1"/>
+                  </a:solidFill>
+                </a:rPr>
+                <a:t>CMHSS</a:t>
+              </a:r>
+              <a:endParaRPr lang="zh-TW" altLang="en-US" dirty="0">
+                <a:solidFill>
+                  <a:schemeClr val="bg1"/>
+                </a:solidFill>
+              </a:endParaRPr>
+            </a:p>
+          </p:txBody>
+        </p:sp>
+        <p:sp>
+          <p:nvSpPr>
+            <p:cNvPr id="20" name="矩形 19"/>
+            <p:cNvSpPr/>
+            <p:nvPr/>
+          </p:nvSpPr>
+          <p:spPr>
+            <a:xfrm>
+              <a:off x="1651398" y="5438796"/>
+              <a:ext cx="2592288" cy="360040"/>
+            </a:xfrm>
+            <a:prstGeom prst="rect">
+              <a:avLst/>
+            </a:prstGeom>
+            <a:ln>
+              <a:solidFill>
+                <a:schemeClr val="tx1"/>
+              </a:solidFill>
+            </a:ln>
+          </p:spPr>
+          <p:style>
+            <a:lnRef idx="2">
+              <a:schemeClr val="accent1">
+                <a:shade val="50000"/>
+              </a:schemeClr>
+            </a:lnRef>
+            <a:fillRef idx="1">
+              <a:schemeClr val="accent1"/>
+            </a:fillRef>
+            <a:effectRef idx="0">
+              <a:schemeClr val="accent1"/>
+            </a:effectRef>
+            <a:fontRef idx="minor">
+              <a:schemeClr val="lt1"/>
+            </a:fontRef>
+          </p:style>
+          <p:txBody>
+            <a:bodyPr rtlCol="0" anchor="ctr"/>
+            <a:lstStyle/>
+            <a:p>
+              <a:pPr algn="ctr"/>
+              <a:r>
+                <a:rPr lang="zh-TW" altLang="en-US" dirty="0" smtClean="0"/>
+                <a:t>課程管理</a:t>
+              </a:r>
+              <a:endParaRPr lang="zh-TW" altLang="en-US" dirty="0"/>
+            </a:p>
+          </p:txBody>
+        </p:sp>
+        <p:sp>
+          <p:nvSpPr>
+            <p:cNvPr id="21" name="矩形 20"/>
+            <p:cNvSpPr/>
+            <p:nvPr/>
+          </p:nvSpPr>
+          <p:spPr>
+            <a:xfrm>
+              <a:off x="1651398" y="4985879"/>
+              <a:ext cx="2592288" cy="360040"/>
+            </a:xfrm>
+            <a:prstGeom prst="rect">
+              <a:avLst/>
+            </a:prstGeom>
+            <a:ln>
+              <a:solidFill>
+                <a:schemeClr val="tx1"/>
+              </a:solidFill>
+            </a:ln>
+          </p:spPr>
+          <p:style>
+            <a:lnRef idx="2">
+              <a:schemeClr val="accent1">
+                <a:shade val="50000"/>
+              </a:schemeClr>
+            </a:lnRef>
+            <a:fillRef idx="1">
+              <a:schemeClr val="accent1"/>
+            </a:fillRef>
+            <a:effectRef idx="0">
+              <a:schemeClr val="accent1"/>
+            </a:effectRef>
+            <a:fontRef idx="minor">
+              <a:schemeClr val="lt1"/>
+            </a:fontRef>
+          </p:style>
+          <p:txBody>
+            <a:bodyPr rtlCol="0" anchor="ctr"/>
+            <a:lstStyle/>
+            <a:p>
+              <a:pPr algn="ctr"/>
+              <a:r>
+                <a:rPr lang="zh-TW" altLang="en-US" dirty="0" smtClean="0"/>
+                <a:t>作業管理</a:t>
+              </a:r>
+              <a:endParaRPr lang="zh-TW" altLang="en-US" dirty="0"/>
+            </a:p>
+          </p:txBody>
+        </p:sp>
+        <p:sp>
+          <p:nvSpPr>
+            <p:cNvPr id="22" name="矩形 21"/>
+            <p:cNvSpPr/>
+            <p:nvPr/>
+          </p:nvSpPr>
+          <p:spPr>
+            <a:xfrm>
+              <a:off x="1651398" y="4531752"/>
+              <a:ext cx="2592288" cy="360040"/>
+            </a:xfrm>
+            <a:prstGeom prst="rect">
+              <a:avLst/>
+            </a:prstGeom>
+            <a:ln>
+              <a:solidFill>
+                <a:schemeClr val="tx1"/>
+              </a:solidFill>
+            </a:ln>
+          </p:spPr>
+          <p:style>
+            <a:lnRef idx="2">
+              <a:schemeClr val="accent1">
+                <a:shade val="50000"/>
+              </a:schemeClr>
+            </a:lnRef>
+            <a:fillRef idx="1">
+              <a:schemeClr val="accent1"/>
+            </a:fillRef>
+            <a:effectRef idx="0">
+              <a:schemeClr val="accent1"/>
+            </a:effectRef>
+            <a:fontRef idx="minor">
+              <a:schemeClr val="lt1"/>
+            </a:fontRef>
+          </p:style>
+          <p:txBody>
+            <a:bodyPr rtlCol="0" anchor="ctr"/>
+            <a:lstStyle/>
+            <a:p>
+              <a:pPr algn="ctr"/>
+              <a:r>
+                <a:rPr lang="zh-TW" altLang="en-US" dirty="0" smtClean="0"/>
+                <a:t>產生報表</a:t>
+              </a:r>
+              <a:endParaRPr lang="zh-TW" altLang="en-US" dirty="0"/>
+            </a:p>
+          </p:txBody>
+        </p:sp>
+      </p:grpSp>
     </p:spTree>
     <p:extLst>
       <p:ext uri="{BB962C8B-B14F-4D97-AF65-F5344CB8AC3E}">
@@ -9306,35 +10024,35 @@
                 <a:gridCol w="2812212">
                   <a:extLst>
                     <a:ext uri="{9D8B030D-6E8A-4147-A177-3AD203B41FA5}">
-                      <a16:colId xmlns:a16="http://schemas.microsoft.com/office/drawing/2014/main" val="2884299164"/>
+                      <a16:colId xmlns:a16="http://schemas.microsoft.com/office/drawing/2014/main" xmlns="" val="2884299164"/>
                     </a:ext>
                   </a:extLst>
                 </a:gridCol>
                 <a:gridCol w="1357798">
                   <a:extLst>
                     <a:ext uri="{9D8B030D-6E8A-4147-A177-3AD203B41FA5}">
-                      <a16:colId xmlns:a16="http://schemas.microsoft.com/office/drawing/2014/main" val="2714764970"/>
+                      <a16:colId xmlns:a16="http://schemas.microsoft.com/office/drawing/2014/main" xmlns="" val="2714764970"/>
                     </a:ext>
                   </a:extLst>
                 </a:gridCol>
                 <a:gridCol w="1357798">
                   <a:extLst>
                     <a:ext uri="{9D8B030D-6E8A-4147-A177-3AD203B41FA5}">
-                      <a16:colId xmlns:a16="http://schemas.microsoft.com/office/drawing/2014/main" val="379868310"/>
+                      <a16:colId xmlns:a16="http://schemas.microsoft.com/office/drawing/2014/main" xmlns="" val="379868310"/>
                     </a:ext>
                   </a:extLst>
                 </a:gridCol>
                 <a:gridCol w="1357798">
                   <a:extLst>
                     <a:ext uri="{9D8B030D-6E8A-4147-A177-3AD203B41FA5}">
-                      <a16:colId xmlns:a16="http://schemas.microsoft.com/office/drawing/2014/main" val="2643519724"/>
+                      <a16:colId xmlns:a16="http://schemas.microsoft.com/office/drawing/2014/main" xmlns="" val="2643519724"/>
                     </a:ext>
                   </a:extLst>
                 </a:gridCol>
                 <a:gridCol w="1343996">
                   <a:extLst>
                     <a:ext uri="{9D8B030D-6E8A-4147-A177-3AD203B41FA5}">
-                      <a16:colId xmlns:a16="http://schemas.microsoft.com/office/drawing/2014/main" val="3932700639"/>
+                      <a16:colId xmlns:a16="http://schemas.microsoft.com/office/drawing/2014/main" xmlns="" val="3932700639"/>
                     </a:ext>
                   </a:extLst>
                 </a:gridCol>
@@ -9472,7 +10190,7 @@
                 </a:tc>
                 <a:extLst>
                   <a:ext uri="{0D108BD9-81ED-4DB2-BD59-A6C34878D82A}">
-                    <a16:rowId xmlns:a16="http://schemas.microsoft.com/office/drawing/2014/main" val="2269722852"/>
+                    <a16:rowId xmlns:a16="http://schemas.microsoft.com/office/drawing/2014/main" xmlns="" val="2269722852"/>
                   </a:ext>
                 </a:extLst>
               </a:tr>
@@ -9627,7 +10345,7 @@
                 </a:tc>
                 <a:extLst>
                   <a:ext uri="{0D108BD9-81ED-4DB2-BD59-A6C34878D82A}">
-                    <a16:rowId xmlns:a16="http://schemas.microsoft.com/office/drawing/2014/main" val="3037958497"/>
+                    <a16:rowId xmlns:a16="http://schemas.microsoft.com/office/drawing/2014/main" xmlns="" val="3037958497"/>
                   </a:ext>
                 </a:extLst>
               </a:tr>
@@ -9782,7 +10500,7 @@
                 </a:tc>
                 <a:extLst>
                   <a:ext uri="{0D108BD9-81ED-4DB2-BD59-A6C34878D82A}">
-                    <a16:rowId xmlns:a16="http://schemas.microsoft.com/office/drawing/2014/main" val="2629449705"/>
+                    <a16:rowId xmlns:a16="http://schemas.microsoft.com/office/drawing/2014/main" xmlns="" val="2629449705"/>
                   </a:ext>
                 </a:extLst>
               </a:tr>
@@ -9940,7 +10658,7 @@
                 </a:tc>
                 <a:extLst>
                   <a:ext uri="{0D108BD9-81ED-4DB2-BD59-A6C34878D82A}">
-                    <a16:rowId xmlns:a16="http://schemas.microsoft.com/office/drawing/2014/main" val="2081270809"/>
+                    <a16:rowId xmlns:a16="http://schemas.microsoft.com/office/drawing/2014/main" xmlns="" val="2081270809"/>
                   </a:ext>
                 </a:extLst>
               </a:tr>
@@ -10095,7 +10813,7 @@
                 </a:tc>
                 <a:extLst>
                   <a:ext uri="{0D108BD9-81ED-4DB2-BD59-A6C34878D82A}">
-                    <a16:rowId xmlns:a16="http://schemas.microsoft.com/office/drawing/2014/main" val="400150635"/>
+                    <a16:rowId xmlns:a16="http://schemas.microsoft.com/office/drawing/2014/main" xmlns="" val="400150635"/>
                   </a:ext>
                 </a:extLst>
               </a:tr>
@@ -10250,7 +10968,7 @@
                 </a:tc>
                 <a:extLst>
                   <a:ext uri="{0D108BD9-81ED-4DB2-BD59-A6C34878D82A}">
-                    <a16:rowId xmlns:a16="http://schemas.microsoft.com/office/drawing/2014/main" val="2243106353"/>
+                    <a16:rowId xmlns:a16="http://schemas.microsoft.com/office/drawing/2014/main" xmlns="" val="2243106353"/>
                   </a:ext>
                 </a:extLst>
               </a:tr>
@@ -10405,7 +11123,7 @@
                 </a:tc>
                 <a:extLst>
                   <a:ext uri="{0D108BD9-81ED-4DB2-BD59-A6C34878D82A}">
-                    <a16:rowId xmlns:a16="http://schemas.microsoft.com/office/drawing/2014/main" val="3821672162"/>
+                    <a16:rowId xmlns:a16="http://schemas.microsoft.com/office/drawing/2014/main" xmlns="" val="3821672162"/>
                   </a:ext>
                 </a:extLst>
               </a:tr>
@@ -10560,7 +11278,7 @@
                 </a:tc>
                 <a:extLst>
                   <a:ext uri="{0D108BD9-81ED-4DB2-BD59-A6C34878D82A}">
-                    <a16:rowId xmlns:a16="http://schemas.microsoft.com/office/drawing/2014/main" val="3481478037"/>
+                    <a16:rowId xmlns:a16="http://schemas.microsoft.com/office/drawing/2014/main" xmlns="" val="3481478037"/>
                   </a:ext>
                 </a:extLst>
               </a:tr>
@@ -10715,7 +11433,7 @@
                 </a:tc>
                 <a:extLst>
                   <a:ext uri="{0D108BD9-81ED-4DB2-BD59-A6C34878D82A}">
-                    <a16:rowId xmlns:a16="http://schemas.microsoft.com/office/drawing/2014/main" val="2352246313"/>
+                    <a16:rowId xmlns:a16="http://schemas.microsoft.com/office/drawing/2014/main" xmlns="" val="2352246313"/>
                   </a:ext>
                 </a:extLst>
               </a:tr>
@@ -10870,7 +11588,7 @@
                 </a:tc>
                 <a:extLst>
                   <a:ext uri="{0D108BD9-81ED-4DB2-BD59-A6C34878D82A}">
-                    <a16:rowId xmlns:a16="http://schemas.microsoft.com/office/drawing/2014/main" val="2724839462"/>
+                    <a16:rowId xmlns:a16="http://schemas.microsoft.com/office/drawing/2014/main" xmlns="" val="2724839462"/>
                   </a:ext>
                 </a:extLst>
               </a:tr>
@@ -11025,7 +11743,7 @@
                 </a:tc>
                 <a:extLst>
                   <a:ext uri="{0D108BD9-81ED-4DB2-BD59-A6C34878D82A}">
-                    <a16:rowId xmlns:a16="http://schemas.microsoft.com/office/drawing/2014/main" val="4197378840"/>
+                    <a16:rowId xmlns:a16="http://schemas.microsoft.com/office/drawing/2014/main" xmlns="" val="4197378840"/>
                   </a:ext>
                 </a:extLst>
               </a:tr>
@@ -11180,7 +11898,7 @@
                 </a:tc>
                 <a:extLst>
                   <a:ext uri="{0D108BD9-81ED-4DB2-BD59-A6C34878D82A}">
-                    <a16:rowId xmlns:a16="http://schemas.microsoft.com/office/drawing/2014/main" val="3687018084"/>
+                    <a16:rowId xmlns:a16="http://schemas.microsoft.com/office/drawing/2014/main" xmlns="" val="3687018084"/>
                   </a:ext>
                 </a:extLst>
               </a:tr>
@@ -11335,7 +12053,7 @@
                 </a:tc>
                 <a:extLst>
                   <a:ext uri="{0D108BD9-81ED-4DB2-BD59-A6C34878D82A}">
-                    <a16:rowId xmlns:a16="http://schemas.microsoft.com/office/drawing/2014/main" val="3831483923"/>
+                    <a16:rowId xmlns:a16="http://schemas.microsoft.com/office/drawing/2014/main" xmlns="" val="3831483923"/>
                   </a:ext>
                 </a:extLst>
               </a:tr>
@@ -11490,7 +12208,7 @@
                 </a:tc>
                 <a:extLst>
                   <a:ext uri="{0D108BD9-81ED-4DB2-BD59-A6C34878D82A}">
-                    <a16:rowId xmlns:a16="http://schemas.microsoft.com/office/drawing/2014/main" val="1008865574"/>
+                    <a16:rowId xmlns:a16="http://schemas.microsoft.com/office/drawing/2014/main" xmlns="" val="1008865574"/>
                   </a:ext>
                 </a:extLst>
               </a:tr>
@@ -11645,7 +12363,7 @@
                 </a:tc>
                 <a:extLst>
                   <a:ext uri="{0D108BD9-81ED-4DB2-BD59-A6C34878D82A}">
-                    <a16:rowId xmlns:a16="http://schemas.microsoft.com/office/drawing/2014/main" val="4256689391"/>
+                    <a16:rowId xmlns:a16="http://schemas.microsoft.com/office/drawing/2014/main" xmlns="" val="4256689391"/>
                   </a:ext>
                 </a:extLst>
               </a:tr>
@@ -11800,7 +12518,7 @@
                 </a:tc>
                 <a:extLst>
                   <a:ext uri="{0D108BD9-81ED-4DB2-BD59-A6C34878D82A}">
-                    <a16:rowId xmlns:a16="http://schemas.microsoft.com/office/drawing/2014/main" val="3843843987"/>
+                    <a16:rowId xmlns:a16="http://schemas.microsoft.com/office/drawing/2014/main" xmlns="" val="3843843987"/>
                   </a:ext>
                 </a:extLst>
               </a:tr>
@@ -11831,7 +12549,7 @@
               <a:pPr>
                 <a:defRPr/>
               </a:pPr>
-              <a:t>2017/10/30</a:t>
+              <a:t>2017/10/31</a:t>
             </a:fld>
             <a:endParaRPr lang="zh-TW" altLang="en-US"/>
           </a:p>
@@ -12007,35 +12725,35 @@
                 <a:gridCol w="2812212">
                   <a:extLst>
                     <a:ext uri="{9D8B030D-6E8A-4147-A177-3AD203B41FA5}">
-                      <a16:colId xmlns:a16="http://schemas.microsoft.com/office/drawing/2014/main" val="2884299164"/>
+                      <a16:colId xmlns:a16="http://schemas.microsoft.com/office/drawing/2014/main" xmlns="" val="2884299164"/>
                     </a:ext>
                   </a:extLst>
                 </a:gridCol>
                 <a:gridCol w="1357798">
                   <a:extLst>
                     <a:ext uri="{9D8B030D-6E8A-4147-A177-3AD203B41FA5}">
-                      <a16:colId xmlns:a16="http://schemas.microsoft.com/office/drawing/2014/main" val="2714764970"/>
+                      <a16:colId xmlns:a16="http://schemas.microsoft.com/office/drawing/2014/main" xmlns="" val="2714764970"/>
                     </a:ext>
                   </a:extLst>
                 </a:gridCol>
                 <a:gridCol w="1357798">
                   <a:extLst>
                     <a:ext uri="{9D8B030D-6E8A-4147-A177-3AD203B41FA5}">
-                      <a16:colId xmlns:a16="http://schemas.microsoft.com/office/drawing/2014/main" val="379868310"/>
+                      <a16:colId xmlns:a16="http://schemas.microsoft.com/office/drawing/2014/main" xmlns="" val="379868310"/>
                     </a:ext>
                   </a:extLst>
                 </a:gridCol>
                 <a:gridCol w="1357798">
                   <a:extLst>
                     <a:ext uri="{9D8B030D-6E8A-4147-A177-3AD203B41FA5}">
-                      <a16:colId xmlns:a16="http://schemas.microsoft.com/office/drawing/2014/main" val="2643519724"/>
+                      <a16:colId xmlns:a16="http://schemas.microsoft.com/office/drawing/2014/main" xmlns="" val="2643519724"/>
                     </a:ext>
                   </a:extLst>
                 </a:gridCol>
                 <a:gridCol w="1343996">
                   <a:extLst>
                     <a:ext uri="{9D8B030D-6E8A-4147-A177-3AD203B41FA5}">
-                      <a16:colId xmlns:a16="http://schemas.microsoft.com/office/drawing/2014/main" val="3932700639"/>
+                      <a16:colId xmlns:a16="http://schemas.microsoft.com/office/drawing/2014/main" xmlns="" val="3932700639"/>
                     </a:ext>
                   </a:extLst>
                 </a:gridCol>
@@ -12173,7 +12891,7 @@
                 </a:tc>
                 <a:extLst>
                   <a:ext uri="{0D108BD9-81ED-4DB2-BD59-A6C34878D82A}">
-                    <a16:rowId xmlns:a16="http://schemas.microsoft.com/office/drawing/2014/main" val="2269722852"/>
+                    <a16:rowId xmlns:a16="http://schemas.microsoft.com/office/drawing/2014/main" xmlns="" val="2269722852"/>
                   </a:ext>
                 </a:extLst>
               </a:tr>
@@ -12331,7 +13049,7 @@
                 </a:tc>
                 <a:extLst>
                   <a:ext uri="{0D108BD9-81ED-4DB2-BD59-A6C34878D82A}">
-                    <a16:rowId xmlns:a16="http://schemas.microsoft.com/office/drawing/2014/main" val="3037958497"/>
+                    <a16:rowId xmlns:a16="http://schemas.microsoft.com/office/drawing/2014/main" xmlns="" val="3037958497"/>
                   </a:ext>
                 </a:extLst>
               </a:tr>
@@ -12492,7 +13210,7 @@
                 </a:tc>
                 <a:extLst>
                   <a:ext uri="{0D108BD9-81ED-4DB2-BD59-A6C34878D82A}">
-                    <a16:rowId xmlns:a16="http://schemas.microsoft.com/office/drawing/2014/main" val="2629449705"/>
+                    <a16:rowId xmlns:a16="http://schemas.microsoft.com/office/drawing/2014/main" xmlns="" val="2629449705"/>
                   </a:ext>
                 </a:extLst>
               </a:tr>
@@ -12650,7 +13368,7 @@
                 </a:tc>
                 <a:extLst>
                   <a:ext uri="{0D108BD9-81ED-4DB2-BD59-A6C34878D82A}">
-                    <a16:rowId xmlns:a16="http://schemas.microsoft.com/office/drawing/2014/main" val="2081270809"/>
+                    <a16:rowId xmlns:a16="http://schemas.microsoft.com/office/drawing/2014/main" xmlns="" val="2081270809"/>
                   </a:ext>
                 </a:extLst>
               </a:tr>
@@ -12808,7 +13526,7 @@
                 </a:tc>
                 <a:extLst>
                   <a:ext uri="{0D108BD9-81ED-4DB2-BD59-A6C34878D82A}">
-                    <a16:rowId xmlns:a16="http://schemas.microsoft.com/office/drawing/2014/main" val="400150635"/>
+                    <a16:rowId xmlns:a16="http://schemas.microsoft.com/office/drawing/2014/main" xmlns="" val="400150635"/>
                   </a:ext>
                 </a:extLst>
               </a:tr>
@@ -12966,7 +13684,7 @@
                 </a:tc>
                 <a:extLst>
                   <a:ext uri="{0D108BD9-81ED-4DB2-BD59-A6C34878D82A}">
-                    <a16:rowId xmlns:a16="http://schemas.microsoft.com/office/drawing/2014/main" val="2243106353"/>
+                    <a16:rowId xmlns:a16="http://schemas.microsoft.com/office/drawing/2014/main" xmlns="" val="2243106353"/>
                   </a:ext>
                 </a:extLst>
               </a:tr>
@@ -13124,7 +13842,7 @@
                 </a:tc>
                 <a:extLst>
                   <a:ext uri="{0D108BD9-81ED-4DB2-BD59-A6C34878D82A}">
-                    <a16:rowId xmlns:a16="http://schemas.microsoft.com/office/drawing/2014/main" val="3821672162"/>
+                    <a16:rowId xmlns:a16="http://schemas.microsoft.com/office/drawing/2014/main" xmlns="" val="3821672162"/>
                   </a:ext>
                 </a:extLst>
               </a:tr>
@@ -13282,7 +14000,7 @@
                 </a:tc>
                 <a:extLst>
                   <a:ext uri="{0D108BD9-81ED-4DB2-BD59-A6C34878D82A}">
-                    <a16:rowId xmlns:a16="http://schemas.microsoft.com/office/drawing/2014/main" val="3481478037"/>
+                    <a16:rowId xmlns:a16="http://schemas.microsoft.com/office/drawing/2014/main" xmlns="" val="3481478037"/>
                   </a:ext>
                 </a:extLst>
               </a:tr>
@@ -13440,7 +14158,7 @@
                 </a:tc>
                 <a:extLst>
                   <a:ext uri="{0D108BD9-81ED-4DB2-BD59-A6C34878D82A}">
-                    <a16:rowId xmlns:a16="http://schemas.microsoft.com/office/drawing/2014/main" val="2352246313"/>
+                    <a16:rowId xmlns:a16="http://schemas.microsoft.com/office/drawing/2014/main" xmlns="" val="2352246313"/>
                   </a:ext>
                 </a:extLst>
               </a:tr>
@@ -13598,7 +14316,7 @@
                 </a:tc>
                 <a:extLst>
                   <a:ext uri="{0D108BD9-81ED-4DB2-BD59-A6C34878D82A}">
-                    <a16:rowId xmlns:a16="http://schemas.microsoft.com/office/drawing/2014/main" val="2724839462"/>
+                    <a16:rowId xmlns:a16="http://schemas.microsoft.com/office/drawing/2014/main" xmlns="" val="2724839462"/>
                   </a:ext>
                 </a:extLst>
               </a:tr>
@@ -13756,7 +14474,7 @@
                 </a:tc>
                 <a:extLst>
                   <a:ext uri="{0D108BD9-81ED-4DB2-BD59-A6C34878D82A}">
-                    <a16:rowId xmlns:a16="http://schemas.microsoft.com/office/drawing/2014/main" val="4197378840"/>
+                    <a16:rowId xmlns:a16="http://schemas.microsoft.com/office/drawing/2014/main" xmlns="" val="4197378840"/>
                   </a:ext>
                 </a:extLst>
               </a:tr>
@@ -13914,7 +14632,7 @@
                 </a:tc>
                 <a:extLst>
                   <a:ext uri="{0D108BD9-81ED-4DB2-BD59-A6C34878D82A}">
-                    <a16:rowId xmlns:a16="http://schemas.microsoft.com/office/drawing/2014/main" val="3687018084"/>
+                    <a16:rowId xmlns:a16="http://schemas.microsoft.com/office/drawing/2014/main" xmlns="" val="3687018084"/>
                   </a:ext>
                 </a:extLst>
               </a:tr>
@@ -14072,7 +14790,7 @@
                 </a:tc>
                 <a:extLst>
                   <a:ext uri="{0D108BD9-81ED-4DB2-BD59-A6C34878D82A}">
-                    <a16:rowId xmlns:a16="http://schemas.microsoft.com/office/drawing/2014/main" val="3831483923"/>
+                    <a16:rowId xmlns:a16="http://schemas.microsoft.com/office/drawing/2014/main" xmlns="" val="3831483923"/>
                   </a:ext>
                 </a:extLst>
               </a:tr>
@@ -14230,7 +14948,7 @@
                 </a:tc>
                 <a:extLst>
                   <a:ext uri="{0D108BD9-81ED-4DB2-BD59-A6C34878D82A}">
-                    <a16:rowId xmlns:a16="http://schemas.microsoft.com/office/drawing/2014/main" val="1008865574"/>
+                    <a16:rowId xmlns:a16="http://schemas.microsoft.com/office/drawing/2014/main" xmlns="" val="1008865574"/>
                   </a:ext>
                 </a:extLst>
               </a:tr>
@@ -14388,7 +15106,7 @@
                 </a:tc>
                 <a:extLst>
                   <a:ext uri="{0D108BD9-81ED-4DB2-BD59-A6C34878D82A}">
-                    <a16:rowId xmlns:a16="http://schemas.microsoft.com/office/drawing/2014/main" val="4256689391"/>
+                    <a16:rowId xmlns:a16="http://schemas.microsoft.com/office/drawing/2014/main" xmlns="" val="4256689391"/>
                   </a:ext>
                 </a:extLst>
               </a:tr>
@@ -14419,7 +15137,7 @@
               <a:pPr>
                 <a:defRPr/>
               </a:pPr>
-              <a:t>2017/10/30</a:t>
+              <a:t>2017/10/31</a:t>
             </a:fld>
             <a:endParaRPr lang="zh-TW" altLang="en-US"/>
           </a:p>
@@ -14595,35 +15313,35 @@
                 <a:gridCol w="2812212">
                   <a:extLst>
                     <a:ext uri="{9D8B030D-6E8A-4147-A177-3AD203B41FA5}">
-                      <a16:colId xmlns:a16="http://schemas.microsoft.com/office/drawing/2014/main" val="2884299164"/>
+                      <a16:colId xmlns:a16="http://schemas.microsoft.com/office/drawing/2014/main" xmlns="" val="2884299164"/>
                     </a:ext>
                   </a:extLst>
                 </a:gridCol>
                 <a:gridCol w="1357798">
                   <a:extLst>
                     <a:ext uri="{9D8B030D-6E8A-4147-A177-3AD203B41FA5}">
-                      <a16:colId xmlns:a16="http://schemas.microsoft.com/office/drawing/2014/main" val="2714764970"/>
+                      <a16:colId xmlns:a16="http://schemas.microsoft.com/office/drawing/2014/main" xmlns="" val="2714764970"/>
                     </a:ext>
                   </a:extLst>
                 </a:gridCol>
                 <a:gridCol w="1357798">
                   <a:extLst>
                     <a:ext uri="{9D8B030D-6E8A-4147-A177-3AD203B41FA5}">
-                      <a16:colId xmlns:a16="http://schemas.microsoft.com/office/drawing/2014/main" val="379868310"/>
+                      <a16:colId xmlns:a16="http://schemas.microsoft.com/office/drawing/2014/main" xmlns="" val="379868310"/>
                     </a:ext>
                   </a:extLst>
                 </a:gridCol>
                 <a:gridCol w="1357798">
                   <a:extLst>
                     <a:ext uri="{9D8B030D-6E8A-4147-A177-3AD203B41FA5}">
-                      <a16:colId xmlns:a16="http://schemas.microsoft.com/office/drawing/2014/main" val="2643519724"/>
+                      <a16:colId xmlns:a16="http://schemas.microsoft.com/office/drawing/2014/main" xmlns="" val="2643519724"/>
                     </a:ext>
                   </a:extLst>
                 </a:gridCol>
                 <a:gridCol w="1343996">
                   <a:extLst>
                     <a:ext uri="{9D8B030D-6E8A-4147-A177-3AD203B41FA5}">
-                      <a16:colId xmlns:a16="http://schemas.microsoft.com/office/drawing/2014/main" val="3932700639"/>
+                      <a16:colId xmlns:a16="http://schemas.microsoft.com/office/drawing/2014/main" xmlns="" val="3932700639"/>
                     </a:ext>
                   </a:extLst>
                 </a:gridCol>
@@ -14761,7 +15479,7 @@
                 </a:tc>
                 <a:extLst>
                   <a:ext uri="{0D108BD9-81ED-4DB2-BD59-A6C34878D82A}">
-                    <a16:rowId xmlns:a16="http://schemas.microsoft.com/office/drawing/2014/main" val="2269722852"/>
+                    <a16:rowId xmlns:a16="http://schemas.microsoft.com/office/drawing/2014/main" xmlns="" val="2269722852"/>
                   </a:ext>
                 </a:extLst>
               </a:tr>
@@ -14919,7 +15637,7 @@
                 </a:tc>
                 <a:extLst>
                   <a:ext uri="{0D108BD9-81ED-4DB2-BD59-A6C34878D82A}">
-                    <a16:rowId xmlns:a16="http://schemas.microsoft.com/office/drawing/2014/main" val="3037958497"/>
+                    <a16:rowId xmlns:a16="http://schemas.microsoft.com/office/drawing/2014/main" xmlns="" val="3037958497"/>
                   </a:ext>
                 </a:extLst>
               </a:tr>
@@ -15077,7 +15795,7 @@
                 </a:tc>
                 <a:extLst>
                   <a:ext uri="{0D108BD9-81ED-4DB2-BD59-A6C34878D82A}">
-                    <a16:rowId xmlns:a16="http://schemas.microsoft.com/office/drawing/2014/main" val="2629449705"/>
+                    <a16:rowId xmlns:a16="http://schemas.microsoft.com/office/drawing/2014/main" xmlns="" val="2629449705"/>
                   </a:ext>
                 </a:extLst>
               </a:tr>
@@ -15235,7 +15953,7 @@
                 </a:tc>
                 <a:extLst>
                   <a:ext uri="{0D108BD9-81ED-4DB2-BD59-A6C34878D82A}">
-                    <a16:rowId xmlns:a16="http://schemas.microsoft.com/office/drawing/2014/main" val="2081270809"/>
+                    <a16:rowId xmlns:a16="http://schemas.microsoft.com/office/drawing/2014/main" xmlns="" val="2081270809"/>
                   </a:ext>
                 </a:extLst>
               </a:tr>
@@ -15393,7 +16111,7 @@
                 </a:tc>
                 <a:extLst>
                   <a:ext uri="{0D108BD9-81ED-4DB2-BD59-A6C34878D82A}">
-                    <a16:rowId xmlns:a16="http://schemas.microsoft.com/office/drawing/2014/main" val="1725899984"/>
+                    <a16:rowId xmlns:a16="http://schemas.microsoft.com/office/drawing/2014/main" xmlns="" val="1725899984"/>
                   </a:ext>
                 </a:extLst>
               </a:tr>
@@ -15424,7 +16142,7 @@
               <a:pPr>
                 <a:defRPr/>
               </a:pPr>
-              <a:t>2017/10/30</a:t>
+              <a:t>2017/10/31</a:t>
             </a:fld>
             <a:endParaRPr lang="zh-TW" altLang="en-US"/>
           </a:p>

</xml_diff>